<commit_message>
Daily updates, Amount svaings per year.
</commit_message>
<xml_diff>
--- a/Team14_Presentation_Kijahre.pptx
+++ b/Team14_Presentation_Kijahre.pptx
@@ -5,7 +5,7 @@
     <p:sldMasterId id="2147483648" r:id="rId1"/>
   </p:sldMasterIdLst>
   <p:notesMasterIdLst>
-    <p:notesMasterId r:id="rId9"/>
+    <p:notesMasterId r:id="rId10"/>
   </p:notesMasterIdLst>
   <p:sldIdLst>
     <p:sldId id="290" r:id="rId2"/>
@@ -14,7 +14,8 @@
     <p:sldId id="292" r:id="rId5"/>
     <p:sldId id="293" r:id="rId6"/>
     <p:sldId id="270" r:id="rId7"/>
-    <p:sldId id="266" r:id="rId8"/>
+    <p:sldId id="294" r:id="rId8"/>
+    <p:sldId id="266" r:id="rId9"/>
   </p:sldIdLst>
   <p:sldSz cx="12192000" cy="6858000"/>
   <p:notesSz cx="6858000" cy="9144000"/>
@@ -955,7 +956,7 @@
           </a:pPr>
           <a:r>
             <a:rPr lang="en-US" sz="2000" dirty="0"/>
-            <a:t>predict lowest price by all features</a:t>
+            <a:t>predict lowest price by all features (98% accuracy)</a:t>
           </a:r>
         </a:p>
       </dgm:t>
@@ -1002,7 +1003,10 @@
             <a:rPr lang="en-US" sz="2000" dirty="0" err="1"/>
             <a:t>dow</a:t>
           </a:r>
-          <a:endParaRPr lang="en-US" sz="2000" dirty="0"/>
+          <a:r>
+            <a:rPr lang="en-US" sz="2000" dirty="0"/>
+            <a:t> (68% and rising)</a:t>
+          </a:r>
         </a:p>
       </dgm:t>
     </dgm:pt>
@@ -1042,7 +1046,7 @@
           </a:pPr>
           <a:r>
             <a:rPr lang="en-US" sz="2000" dirty="0"/>
-            <a:t>predict lowest price by region</a:t>
+            <a:t>predict lowest price by region (74% and rising)</a:t>
           </a:r>
         </a:p>
       </dgm:t>
@@ -1141,7 +1145,7 @@
           </a:pPr>
           <a:r>
             <a:rPr lang="en-US" sz="2000" dirty="0"/>
-            <a:t>predict lowest price by all features</a:t>
+            <a:t>predict lowest price by all features (0% accuracy due to user error)</a:t>
           </a:r>
         </a:p>
       </dgm:t>
@@ -1182,7 +1186,7 @@
       <dgm:spPr/>
     </dgm:pt>
     <dgm:pt modelId="{2CCFBDF6-19E1-4115-8278-4A6E2EA73C39}" type="pres">
-      <dgm:prSet presAssocID="{819785AA-CCAD-4C98-BE70-48F823F3CEBA}" presName="iconRect" presStyleLbl="node1" presStyleIdx="0" presStyleCnt="2" custLinFactNeighborX="-4744" custLinFactNeighborY="-87963"/>
+      <dgm:prSet presAssocID="{819785AA-CCAD-4C98-BE70-48F823F3CEBA}" presName="iconRect" presStyleLbl="node1" presStyleIdx="0" presStyleCnt="2" custLinFactY="-29103" custLinFactNeighborX="-7972" custLinFactNeighborY="-100000"/>
       <dgm:spPr>
         <a:blipFill>
           <a:blip xmlns:r="http://schemas.openxmlformats.org/officeDocument/2006/relationships" r:embed="rId1">
@@ -1211,7 +1215,7 @@
       <dgm:spPr/>
     </dgm:pt>
     <dgm:pt modelId="{5F8C9054-79A0-4429-9FAB-1899D1C53E1B}" type="pres">
-      <dgm:prSet presAssocID="{819785AA-CCAD-4C98-BE70-48F823F3CEBA}" presName="parTx" presStyleLbl="revTx" presStyleIdx="0" presStyleCnt="4" custLinFactNeighborX="-2060" custLinFactNeighborY="-64683">
+      <dgm:prSet presAssocID="{819785AA-CCAD-4C98-BE70-48F823F3CEBA}" presName="parTx" presStyleLbl="revTx" presStyleIdx="0" presStyleCnt="4" custLinFactY="-659" custLinFactNeighborX="-2317" custLinFactNeighborY="-100000">
         <dgm:presLayoutVars>
           <dgm:chMax val="0"/>
           <dgm:chPref val="0"/>
@@ -1224,7 +1228,7 @@
       <dgm:spPr/>
     </dgm:pt>
     <dgm:pt modelId="{58F8A4A8-47B8-4CC5-AF90-64C0771B5BDA}" type="pres">
-      <dgm:prSet presAssocID="{819785AA-CCAD-4C98-BE70-48F823F3CEBA}" presName="desTx" presStyleLbl="revTx" presStyleIdx="1" presStyleCnt="4" custScaleX="134554" custScaleY="116730" custLinFactNeighborX="5364" custLinFactNeighborY="-2767">
+      <dgm:prSet presAssocID="{819785AA-CCAD-4C98-BE70-48F823F3CEBA}" presName="desTx" presStyleLbl="revTx" presStyleIdx="1" presStyleCnt="4" custScaleX="134554" custScaleY="116730" custLinFactY="-100000" custLinFactNeighborX="5364" custLinFactNeighborY="-137408">
         <dgm:presLayoutVars/>
       </dgm:prSet>
       <dgm:spPr/>
@@ -1238,7 +1242,7 @@
       <dgm:spPr/>
     </dgm:pt>
     <dgm:pt modelId="{E4272FEA-B93D-4E05-926A-4390D0A3AFB3}" type="pres">
-      <dgm:prSet presAssocID="{EC05F506-026B-4342-ABD9-8BA8B012AC42}" presName="iconRect" presStyleLbl="node1" presStyleIdx="1" presStyleCnt="2" custLinFactNeighborY="-87963"/>
+      <dgm:prSet presAssocID="{EC05F506-026B-4342-ABD9-8BA8B012AC42}" presName="iconRect" presStyleLbl="node1" presStyleIdx="1" presStyleCnt="2" custLinFactY="-29838" custLinFactNeighborX="-735" custLinFactNeighborY="-100000"/>
       <dgm:spPr>
         <a:blipFill>
           <a:blip xmlns:r="http://schemas.openxmlformats.org/officeDocument/2006/relationships" r:embed="rId3">
@@ -1267,7 +1271,7 @@
       <dgm:spPr/>
     </dgm:pt>
     <dgm:pt modelId="{5B48244A-4350-41A5-9E47-CB9892B29360}" type="pres">
-      <dgm:prSet presAssocID="{EC05F506-026B-4342-ABD9-8BA8B012AC42}" presName="parTx" presStyleLbl="revTx" presStyleIdx="2" presStyleCnt="4" custLinFactNeighborX="-3172" custLinFactNeighborY="-65768">
+      <dgm:prSet presAssocID="{EC05F506-026B-4342-ABD9-8BA8B012AC42}" presName="parTx" presStyleLbl="revTx" presStyleIdx="2" presStyleCnt="4" custLinFactY="-6878" custLinFactNeighborX="-5467" custLinFactNeighborY="-100000">
         <dgm:presLayoutVars>
           <dgm:chMax val="0"/>
           <dgm:chPref val="0"/>
@@ -1280,7 +1284,7 @@
       <dgm:spPr/>
     </dgm:pt>
     <dgm:pt modelId="{67F89362-ABBE-49ED-8957-F27777EC3341}" type="pres">
-      <dgm:prSet presAssocID="{EC05F506-026B-4342-ABD9-8BA8B012AC42}" presName="desTx" presStyleLbl="revTx" presStyleIdx="3" presStyleCnt="4" custScaleX="143661">
+      <dgm:prSet presAssocID="{EC05F506-026B-4342-ABD9-8BA8B012AC42}" presName="desTx" presStyleLbl="revTx" presStyleIdx="3" presStyleCnt="4" custScaleX="143661" custLinFactY="-100000" custLinFactNeighborX="-1883" custLinFactNeighborY="-123935">
         <dgm:presLayoutVars/>
       </dgm:prSet>
       <dgm:spPr/>
@@ -1339,7 +1343,7 @@
       </dsp:nvSpPr>
       <dsp:spPr>
         <a:xfrm>
-          <a:off x="1170296" y="319786"/>
+          <a:off x="1142964" y="0"/>
           <a:ext cx="846719" cy="846719"/>
         </a:xfrm>
         <a:prstGeom prst="rect">
@@ -1396,7 +1400,7 @@
       </dsp:nvSpPr>
       <dsp:spPr>
         <a:xfrm>
-          <a:off x="374390" y="1274887"/>
+          <a:off x="368173" y="870562"/>
           <a:ext cx="2419197" cy="1123875"/>
         </a:xfrm>
         <a:prstGeom prst="rect">
@@ -1463,7 +1467,7 @@
         </a:p>
       </dsp:txBody>
       <dsp:txXfrm>
-        <a:off x="374390" y="1274887"/>
+        <a:off x="368173" y="870562"/>
         <a:ext cx="2419197" cy="1123875"/>
       </dsp:txXfrm>
     </dsp:sp>
@@ -1474,7 +1478,7 @@
       </dsp:nvSpPr>
       <dsp:spPr>
         <a:xfrm>
-          <a:off x="136027" y="2990714"/>
+          <a:off x="136027" y="2306469"/>
           <a:ext cx="3255127" cy="340400"/>
         </a:xfrm>
         <a:prstGeom prst="rect">
@@ -1518,7 +1522,7 @@
           </a:pPr>
           <a:r>
             <a:rPr lang="en-US" sz="2000" kern="1200" dirty="0"/>
-            <a:t>predict lowest price by all features</a:t>
+            <a:t>predict lowest price by all features (98% accuracy)</a:t>
           </a:r>
         </a:p>
         <a:p>
@@ -1542,7 +1546,10 @@
             <a:rPr lang="en-US" sz="2000" kern="1200" dirty="0" err="1"/>
             <a:t>dow</a:t>
           </a:r>
-          <a:endParaRPr lang="en-US" sz="2000" kern="1200" dirty="0"/>
+          <a:r>
+            <a:rPr lang="en-US" sz="2000" kern="1200" dirty="0"/>
+            <a:t> (68% and rising)</a:t>
+          </a:r>
         </a:p>
         <a:p>
           <a:pPr marL="0" lvl="0" indent="0" algn="l" defTabSz="889000">
@@ -1559,12 +1566,12 @@
           </a:pPr>
           <a:r>
             <a:rPr lang="en-US" sz="2000" kern="1200" dirty="0"/>
-            <a:t>predict lowest price by region</a:t>
+            <a:t>predict lowest price by region (74% and rising)</a:t>
           </a:r>
         </a:p>
       </dsp:txBody>
       <dsp:txXfrm>
-        <a:off x="136027" y="2990714"/>
+        <a:off x="136027" y="2306469"/>
         <a:ext cx="3255127" cy="340400"/>
       </dsp:txXfrm>
     </dsp:sp>
@@ -1575,7 +1582,7 @@
       </dsp:nvSpPr>
       <dsp:spPr>
         <a:xfrm>
-          <a:off x="4999110" y="331982"/>
+          <a:off x="4992886" y="0"/>
           <a:ext cx="846719" cy="846719"/>
         </a:xfrm>
         <a:prstGeom prst="rect">
@@ -1632,7 +1639,7 @@
       </dsp:nvSpPr>
       <dsp:spPr>
         <a:xfrm>
-          <a:off x="4136134" y="1274890"/>
+          <a:off x="4080613" y="812865"/>
           <a:ext cx="2419197" cy="1123875"/>
         </a:xfrm>
         <a:prstGeom prst="rect">
@@ -1698,7 +1705,7 @@
         </a:p>
       </dsp:txBody>
       <dsp:txXfrm>
-        <a:off x="4136134" y="1274890"/>
+        <a:off x="4080613" y="812865"/>
         <a:ext cx="2419197" cy="1123875"/>
       </dsp:txXfrm>
     </dsp:sp>
@@ -1709,7 +1716,7 @@
       </dsp:nvSpPr>
       <dsp:spPr>
         <a:xfrm>
-          <a:off x="3684748" y="3035373"/>
+          <a:off x="3639194" y="2382349"/>
           <a:ext cx="3475443" cy="291613"/>
         </a:xfrm>
         <a:prstGeom prst="rect">
@@ -1753,12 +1760,12 @@
           </a:pPr>
           <a:r>
             <a:rPr lang="en-US" sz="2000" kern="1200" dirty="0"/>
-            <a:t>predict lowest price by all features</a:t>
+            <a:t>predict lowest price by all features (0% accuracy due to user error)</a:t>
           </a:r>
         </a:p>
       </dsp:txBody>
       <dsp:txXfrm>
-        <a:off x="3684748" y="3035373"/>
+        <a:off x="3639194" y="2382349"/>
         <a:ext cx="3475443" cy="291613"/>
       </dsp:txXfrm>
     </dsp:sp>
@@ -3083,7 +3090,7 @@
           <a:p>
             <a:fld id="{AEBF5B9D-DC25-9C4D-B63B-18668C98E4DC}" type="datetimeFigureOut">
               <a:rPr lang="en-US" smtClean="0"/>
-              <a:t>11/17/2022</a:t>
+              <a:t>11/18/2022</a:t>
             </a:fld>
             <a:endParaRPr lang="en-US"/>
           </a:p>
@@ -3497,7 +3504,7 @@
           <a:p>
             <a:fld id="{CA4913DA-71AB-2447-B2FB-5226151470FA}" type="datetime1">
               <a:rPr lang="en-US" smtClean="0"/>
-              <a:t>11/17/2022</a:t>
+              <a:t>11/18/2022</a:t>
             </a:fld>
             <a:endParaRPr lang="en-US"/>
           </a:p>
@@ -3695,7 +3702,7 @@
           <a:p>
             <a:fld id="{20C2316D-F49A-E545-AAF4-772D5B1D1AAC}" type="datetime1">
               <a:rPr lang="en-US" smtClean="0"/>
-              <a:t>11/17/2022</a:t>
+              <a:t>11/18/2022</a:t>
             </a:fld>
             <a:endParaRPr lang="en-US"/>
           </a:p>
@@ -3903,7 +3910,7 @@
           <a:p>
             <a:fld id="{AE72AC5A-C52C-034E-BF3C-FD6CA88C0FDA}" type="datetime1">
               <a:rPr lang="en-US" smtClean="0"/>
-              <a:t>11/17/2022</a:t>
+              <a:t>11/18/2022</a:t>
             </a:fld>
             <a:endParaRPr lang="en-US"/>
           </a:p>
@@ -4101,7 +4108,7 @@
           <a:p>
             <a:fld id="{F9523CD4-0C3D-D94C-8B1C-6B1616C58207}" type="datetime1">
               <a:rPr lang="en-US" smtClean="0"/>
-              <a:t>11/17/2022</a:t>
+              <a:t>11/18/2022</a:t>
             </a:fld>
             <a:endParaRPr lang="en-US"/>
           </a:p>
@@ -4376,7 +4383,7 @@
           <a:p>
             <a:fld id="{AC946497-659A-CA42-87E8-72B157FCB6A5}" type="datetime1">
               <a:rPr lang="en-US" smtClean="0"/>
-              <a:t>11/17/2022</a:t>
+              <a:t>11/18/2022</a:t>
             </a:fld>
             <a:endParaRPr lang="en-US"/>
           </a:p>
@@ -4641,7 +4648,7 @@
           <a:p>
             <a:fld id="{75FB8963-3E22-2148-9E4F-C00A5A3507A8}" type="datetime1">
               <a:rPr lang="en-US" smtClean="0"/>
-              <a:t>11/17/2022</a:t>
+              <a:t>11/18/2022</a:t>
             </a:fld>
             <a:endParaRPr lang="en-US"/>
           </a:p>
@@ -5053,7 +5060,7 @@
           <a:p>
             <a:fld id="{D467DFFA-6F12-804C-A322-D0CA765945C9}" type="datetime1">
               <a:rPr lang="en-US" smtClean="0"/>
-              <a:t>11/17/2022</a:t>
+              <a:t>11/18/2022</a:t>
             </a:fld>
             <a:endParaRPr lang="en-US"/>
           </a:p>
@@ -5194,7 +5201,7 @@
           <a:p>
             <a:fld id="{41B74A57-390C-284E-97B7-7B29912A3226}" type="datetime1">
               <a:rPr lang="en-US" smtClean="0"/>
-              <a:t>11/17/2022</a:t>
+              <a:t>11/18/2022</a:t>
             </a:fld>
             <a:endParaRPr lang="en-US"/>
           </a:p>
@@ -5307,7 +5314,7 @@
           <a:p>
             <a:fld id="{285548A5-1930-7943-8512-555536845564}" type="datetime1">
               <a:rPr lang="en-US" smtClean="0"/>
-              <a:t>11/17/2022</a:t>
+              <a:t>11/18/2022</a:t>
             </a:fld>
             <a:endParaRPr lang="en-US"/>
           </a:p>
@@ -5618,7 +5625,7 @@
           <a:p>
             <a:fld id="{9223AAD4-10AF-E146-834D-80824F60E7CA}" type="datetime1">
               <a:rPr lang="en-US" smtClean="0"/>
-              <a:t>11/17/2022</a:t>
+              <a:t>11/18/2022</a:t>
             </a:fld>
             <a:endParaRPr lang="en-US"/>
           </a:p>
@@ -5906,7 +5913,7 @@
           <a:p>
             <a:fld id="{DAF52F01-FFC1-E344-9EAE-D6D43AEF4980}" type="datetime1">
               <a:rPr lang="en-US" smtClean="0"/>
-              <a:t>11/17/2022</a:t>
+              <a:t>11/18/2022</a:t>
             </a:fld>
             <a:endParaRPr lang="en-US"/>
           </a:p>
@@ -6147,7 +6154,7 @@
           <a:p>
             <a:fld id="{BEAC80F2-956B-BB41-8A57-F14E976EB7DD}" type="datetime1">
               <a:rPr lang="en-US" smtClean="0"/>
-              <a:t>11/17/2022</a:t>
+              <a:t>11/18/2022</a:t>
             </a:fld>
             <a:endParaRPr lang="en-US"/>
           </a:p>
@@ -14495,7 +14502,7 @@
         <p:spPr>
           <a:xfrm>
             <a:off x="336884" y="1173480"/>
-            <a:ext cx="7450756" cy="5003483"/>
+            <a:ext cx="7450756" cy="5673311"/>
           </a:xfrm>
         </p:spPr>
         <p:txBody>
@@ -14504,13 +14511,14 @@
           </a:bodyPr>
           <a:lstStyle/>
           <a:p>
-            <a:pPr marL="0" algn="l" rtl="0" eaLnBrk="1" latinLnBrk="0" hangingPunct="1">
+            <a:pPr marL="0" indent="0" algn="l" rtl="0" eaLnBrk="1" latinLnBrk="0" hangingPunct="1">
               <a:spcBef>
                 <a:spcPts val="0"/>
               </a:spcBef>
               <a:spcAft>
                 <a:spcPts val="0"/>
               </a:spcAft>
+              <a:buNone/>
             </a:pPr>
             <a:r>
               <a:rPr lang="en-US" sz="2400" b="1" dirty="0">
@@ -14567,60 +14575,7 @@
                 <a:ea typeface="Calibri" panose="020F0502020204030204" pitchFamily="34" charset="0"/>
                 <a:cs typeface="Times New Roman" panose="02020603050405020304" pitchFamily="18" charset="0"/>
               </a:rPr>
-              <a:t>vendor</a:t>
-            </a:r>
-            <a:endParaRPr lang="en-US" sz="2400" dirty="0">
-              <a:effectLst/>
-              <a:highlight>
-                <a:srgbClr val="FFFF00"/>
-              </a:highlight>
-              <a:latin typeface="+mj-lt"/>
-              <a:ea typeface="Calibri" panose="020F0502020204030204" pitchFamily="34" charset="0"/>
-              <a:cs typeface="Times New Roman" panose="02020603050405020304" pitchFamily="18" charset="0"/>
-            </a:endParaRPr>
-          </a:p>
-          <a:p>
-            <a:pPr lvl="1">
-              <a:lnSpc>
-                <a:spcPct val="115000"/>
-              </a:lnSpc>
-              <a:spcBef>
-                <a:spcPts val="0"/>
-              </a:spcBef>
-            </a:pPr>
-            <a:r>
-              <a:rPr lang="en-US" sz="2400" dirty="0">
-                <a:solidFill>
-                  <a:srgbClr val="1D1C1D"/>
-                </a:solidFill>
-                <a:effectLst/>
-                <a:latin typeface="+mj-lt"/>
-                <a:ea typeface="Calibri" panose="020F0502020204030204" pitchFamily="34" charset="0"/>
-                <a:cs typeface="Times New Roman" panose="02020603050405020304" pitchFamily="18" charset="0"/>
-              </a:rPr>
-              <a:t>Location</a:t>
-            </a:r>
-          </a:p>
-          <a:p>
-            <a:pPr lvl="1">
-              <a:lnSpc>
-                <a:spcPct val="115000"/>
-              </a:lnSpc>
-              <a:spcBef>
-                <a:spcPts val="0"/>
-              </a:spcBef>
-            </a:pPr>
-            <a:r>
-              <a:rPr lang="en-US" sz="2400" dirty="0">
-                <a:solidFill>
-                  <a:srgbClr val="1D1C1D"/>
-                </a:solidFill>
-                <a:effectLst/>
-                <a:latin typeface="+mj-lt"/>
-                <a:ea typeface="Calibri" panose="020F0502020204030204" pitchFamily="34" charset="0"/>
-                <a:cs typeface="Times New Roman" panose="02020603050405020304" pitchFamily="18" charset="0"/>
-              </a:rPr>
-              <a:t>zip</a:t>
+              <a:t>Vendor</a:t>
             </a:r>
           </a:p>
           <a:p>
@@ -14704,33 +14659,6 @@
               <a:spcBef>
                 <a:spcPts val="0"/>
               </a:spcBef>
-              <a:spcAft>
-                <a:spcPts val="800"/>
-              </a:spcAft>
-            </a:pPr>
-            <a:r>
-              <a:rPr lang="en-US" sz="2400" dirty="0">
-                <a:solidFill>
-                  <a:srgbClr val="1D1C1D"/>
-                </a:solidFill>
-                <a:latin typeface="+mj-lt"/>
-                <a:ea typeface="Calibri" panose="020F0502020204030204" pitchFamily="34" charset="0"/>
-                <a:cs typeface="Times New Roman" panose="02020603050405020304" pitchFamily="18" charset="0"/>
-              </a:rPr>
-              <a:t>Date</a:t>
-            </a:r>
-          </a:p>
-          <a:p>
-            <a:pPr lvl="1">
-              <a:lnSpc>
-                <a:spcPct val="115000"/>
-              </a:lnSpc>
-              <a:spcBef>
-                <a:spcPts val="0"/>
-              </a:spcBef>
-              <a:spcAft>
-                <a:spcPts val="800"/>
-              </a:spcAft>
             </a:pPr>
             <a:r>
               <a:rPr lang="en-US" dirty="0" err="1">
@@ -14763,9 +14691,6 @@
               <a:t>aw_materials</a:t>
             </a:r>
             <a:endParaRPr lang="en-US" sz="2400" dirty="0">
-              <a:solidFill>
-                <a:srgbClr val="1D1C1D"/>
-              </a:solidFill>
               <a:effectLst/>
               <a:highlight>
                 <a:srgbClr val="FFFF00"/>
@@ -14774,6 +14699,74 @@
               <a:ea typeface="Calibri" panose="020F0502020204030204" pitchFamily="34" charset="0"/>
               <a:cs typeface="Times New Roman" panose="02020603050405020304" pitchFamily="18" charset="0"/>
             </a:endParaRPr>
+          </a:p>
+          <a:p>
+            <a:pPr lvl="1">
+              <a:lnSpc>
+                <a:spcPct val="115000"/>
+              </a:lnSpc>
+              <a:spcBef>
+                <a:spcPts val="0"/>
+              </a:spcBef>
+            </a:pPr>
+            <a:r>
+              <a:rPr lang="en-US" sz="2400" dirty="0">
+                <a:solidFill>
+                  <a:srgbClr val="1D1C1D"/>
+                </a:solidFill>
+                <a:effectLst/>
+                <a:latin typeface="+mj-lt"/>
+                <a:ea typeface="Calibri" panose="020F0502020204030204" pitchFamily="34" charset="0"/>
+                <a:cs typeface="Times New Roman" panose="02020603050405020304" pitchFamily="18" charset="0"/>
+              </a:rPr>
+              <a:t>Location</a:t>
+            </a:r>
+          </a:p>
+          <a:p>
+            <a:pPr lvl="1">
+              <a:lnSpc>
+                <a:spcPct val="115000"/>
+              </a:lnSpc>
+              <a:spcBef>
+                <a:spcPts val="0"/>
+              </a:spcBef>
+            </a:pPr>
+            <a:r>
+              <a:rPr lang="en-US" sz="2400" dirty="0">
+                <a:solidFill>
+                  <a:srgbClr val="1D1C1D"/>
+                </a:solidFill>
+                <a:effectLst/>
+                <a:latin typeface="+mj-lt"/>
+                <a:ea typeface="Calibri" panose="020F0502020204030204" pitchFamily="34" charset="0"/>
+                <a:cs typeface="Times New Roman" panose="02020603050405020304" pitchFamily="18" charset="0"/>
+              </a:rPr>
+              <a:t>zip</a:t>
+            </a:r>
+          </a:p>
+          <a:p>
+            <a:pPr lvl="1">
+              <a:lnSpc>
+                <a:spcPct val="115000"/>
+              </a:lnSpc>
+              <a:spcBef>
+                <a:spcPts val="0"/>
+              </a:spcBef>
+              <a:spcAft>
+                <a:spcPts val="800"/>
+              </a:spcAft>
+            </a:pPr>
+            <a:r>
+              <a:rPr lang="en-US" sz="2400" dirty="0">
+                <a:solidFill>
+                  <a:srgbClr val="1D1C1D"/>
+                </a:solidFill>
+                <a:latin typeface="+mj-lt"/>
+                <a:ea typeface="Calibri" panose="020F0502020204030204" pitchFamily="34" charset="0"/>
+                <a:cs typeface="Times New Roman" panose="02020603050405020304" pitchFamily="18" charset="0"/>
+              </a:rPr>
+              <a:t>Date</a:t>
+            </a:r>
           </a:p>
           <a:p>
             <a:pPr lvl="1">
@@ -14809,6 +14802,39 @@
               </a:rPr>
               <a:t>aw_prices</a:t>
             </a:r>
+            <a:endParaRPr lang="en-US" dirty="0">
+              <a:solidFill>
+                <a:srgbClr val="1D1C1D"/>
+              </a:solidFill>
+              <a:latin typeface="+mj-lt"/>
+              <a:ea typeface="Calibri" panose="020F0502020204030204" pitchFamily="34" charset="0"/>
+              <a:cs typeface="Times New Roman" panose="02020603050405020304" pitchFamily="18" charset="0"/>
+            </a:endParaRPr>
+          </a:p>
+          <a:p>
+            <a:pPr marL="457200" lvl="1" indent="0">
+              <a:lnSpc>
+                <a:spcPct val="115000"/>
+              </a:lnSpc>
+              <a:spcBef>
+                <a:spcPts val="0"/>
+              </a:spcBef>
+              <a:spcAft>
+                <a:spcPts val="800"/>
+              </a:spcAft>
+              <a:buNone/>
+            </a:pPr>
+            <a:r>
+              <a:rPr lang="en-US" b="1" dirty="0">
+                <a:solidFill>
+                  <a:srgbClr val="3D3D3D"/>
+                </a:solidFill>
+                <a:latin typeface="Calibri" panose="020F0502020204030204" pitchFamily="34" charset="0"/>
+                <a:ea typeface="Calibri" panose="020F0502020204030204" pitchFamily="34" charset="0"/>
+                <a:cs typeface="Times New Roman" panose="02020603050405020304" pitchFamily="18" charset="0"/>
+              </a:rPr>
+              <a:t>Target = Low Prices</a:t>
+            </a:r>
             <a:endParaRPr lang="en-US" sz="2400" dirty="0">
               <a:solidFill>
                 <a:srgbClr val="1D1C1D"/>
@@ -14840,7 +14866,7 @@
                 <a:ea typeface="Calibri" panose="020F0502020204030204" pitchFamily="34" charset="0"/>
                 <a:cs typeface="Times New Roman" panose="02020603050405020304" pitchFamily="18" charset="0"/>
               </a:rPr>
-              <a:t>(The above highlighted points may have a relationship with price)</a:t>
+              <a:t>(The above highlighted points have a relationship with price)</a:t>
             </a:r>
             <a:endParaRPr lang="en-US" sz="2000" b="1" dirty="0">
               <a:effectLst/>
@@ -21134,6 +21160,251 @@
 <file path=ppt/slides/slide7.xml><?xml version="1.0" encoding="utf-8"?>
 <p:sld xmlns:a="http://schemas.openxmlformats.org/drawingml/2006/main" xmlns:r="http://schemas.openxmlformats.org/officeDocument/2006/relationships" xmlns:p="http://schemas.openxmlformats.org/presentationml/2006/main">
   <p:cSld>
+    <p:spTree>
+      <p:nvGrpSpPr>
+        <p:cNvPr id="1" name=""/>
+        <p:cNvGrpSpPr/>
+        <p:nvPr/>
+      </p:nvGrpSpPr>
+      <p:grpSpPr>
+        <a:xfrm>
+          <a:off x="0" y="0"/>
+          <a:ext cx="0" cy="0"/>
+          <a:chOff x="0" y="0"/>
+          <a:chExt cx="0" cy="0"/>
+        </a:xfrm>
+      </p:grpSpPr>
+      <p:sp>
+        <p:nvSpPr>
+          <p:cNvPr id="2" name="Title 1">
+            <a:extLst>
+              <a:ext uri="{FF2B5EF4-FFF2-40B4-BE49-F238E27FC236}">
+                <a16:creationId xmlns:a16="http://schemas.microsoft.com/office/drawing/2014/main" id="{40BFE40E-51D6-1067-2F46-4F444CDA27F5}"/>
+              </a:ext>
+            </a:extLst>
+          </p:cNvPr>
+          <p:cNvSpPr>
+            <a:spLocks noGrp="1"/>
+          </p:cNvSpPr>
+          <p:nvPr>
+            <p:ph type="title"/>
+          </p:nvPr>
+        </p:nvSpPr>
+        <p:spPr>
+          <a:xfrm>
+            <a:off x="838200" y="365125"/>
+            <a:ext cx="6172200" cy="1325563"/>
+          </a:xfrm>
+        </p:spPr>
+        <p:txBody>
+          <a:bodyPr>
+            <a:normAutofit/>
+          </a:bodyPr>
+          <a:lstStyle/>
+          <a:p>
+            <a:r>
+              <a:rPr lang="en-US" sz="5400" b="0" i="0" u="sng" dirty="0">
+                <a:solidFill>
+                  <a:srgbClr val="000000"/>
+                </a:solidFill>
+                <a:effectLst/>
+                <a:latin typeface="Arial" panose="020B0604020202020204" pitchFamily="34" charset="0"/>
+              </a:rPr>
+              <a:t>The Bottom Line</a:t>
+            </a:r>
+            <a:endParaRPr lang="en-US" sz="5400" dirty="0"/>
+          </a:p>
+        </p:txBody>
+      </p:sp>
+      <p:sp>
+        <p:nvSpPr>
+          <p:cNvPr id="3" name="Content Placeholder 2">
+            <a:extLst>
+              <a:ext uri="{FF2B5EF4-FFF2-40B4-BE49-F238E27FC236}">
+                <a16:creationId xmlns:a16="http://schemas.microsoft.com/office/drawing/2014/main" id="{E8444396-240D-40AF-DE3E-A07092F928A3}"/>
+              </a:ext>
+            </a:extLst>
+          </p:cNvPr>
+          <p:cNvSpPr>
+            <a:spLocks noGrp="1"/>
+          </p:cNvSpPr>
+          <p:nvPr>
+            <p:ph idx="1"/>
+          </p:nvPr>
+        </p:nvSpPr>
+        <p:spPr>
+          <a:xfrm>
+            <a:off x="274476" y="2005012"/>
+            <a:ext cx="6613849" cy="4351338"/>
+          </a:xfrm>
+        </p:spPr>
+        <p:txBody>
+          <a:bodyPr>
+            <a:normAutofit lnSpcReduction="10000"/>
+          </a:bodyPr>
+          <a:lstStyle/>
+          <a:p>
+            <a:pPr indent="0" rtl="0">
+              <a:spcBef>
+                <a:spcPts val="0"/>
+              </a:spcBef>
+              <a:spcAft>
+                <a:spcPts val="1200"/>
+              </a:spcAft>
+              <a:buNone/>
+            </a:pPr>
+            <a:r>
+              <a:rPr lang="en-US" sz="3900" b="0" i="0" u="none" strike="noStrike" dirty="0">
+                <a:solidFill>
+                  <a:srgbClr val="595959"/>
+                </a:solidFill>
+                <a:effectLst/>
+                <a:latin typeface="Arial" panose="020B0604020202020204" pitchFamily="34" charset="0"/>
+              </a:rPr>
+              <a:t>Using our algorithm buying 16 items a day for one year will save you:</a:t>
+            </a:r>
+          </a:p>
+          <a:p>
+            <a:pPr indent="0" rtl="0">
+              <a:spcBef>
+                <a:spcPts val="0"/>
+              </a:spcBef>
+              <a:spcAft>
+                <a:spcPts val="1200"/>
+              </a:spcAft>
+              <a:buNone/>
+            </a:pPr>
+            <a:endParaRPr lang="en-US" sz="3900" b="0" dirty="0">
+              <a:effectLst/>
+            </a:endParaRPr>
+          </a:p>
+          <a:p>
+            <a:pPr marL="0" indent="0" algn="ctr" rtl="0">
+              <a:spcBef>
+                <a:spcPts val="0"/>
+              </a:spcBef>
+              <a:spcAft>
+                <a:spcPts val="0"/>
+              </a:spcAft>
+              <a:buNone/>
+            </a:pPr>
+            <a:r>
+              <a:rPr lang="en-US" sz="9600" b="1" i="0" u="sng" dirty="0">
+                <a:solidFill>
+                  <a:srgbClr val="4AA54D"/>
+                </a:solidFill>
+                <a:effectLst/>
+                <a:latin typeface="Arial" panose="020B0604020202020204" pitchFamily="34" charset="0"/>
+              </a:rPr>
+              <a:t>$79,690</a:t>
+            </a:r>
+            <a:endParaRPr lang="en-US" sz="9600" b="0" dirty="0">
+              <a:effectLst/>
+            </a:endParaRPr>
+          </a:p>
+          <a:p>
+            <a:pPr marL="0" indent="0">
+              <a:buNone/>
+            </a:pPr>
+            <a:br>
+              <a:rPr lang="en-US" dirty="0"/>
+            </a:br>
+            <a:endParaRPr lang="en-US" dirty="0"/>
+          </a:p>
+        </p:txBody>
+      </p:sp>
+      <p:sp>
+        <p:nvSpPr>
+          <p:cNvPr id="4" name="Slide Number Placeholder 3">
+            <a:extLst>
+              <a:ext uri="{FF2B5EF4-FFF2-40B4-BE49-F238E27FC236}">
+                <a16:creationId xmlns:a16="http://schemas.microsoft.com/office/drawing/2014/main" id="{0E2CFC9A-496E-0CCC-A901-E74F78A8F0EA}"/>
+              </a:ext>
+            </a:extLst>
+          </p:cNvPr>
+          <p:cNvSpPr>
+            <a:spLocks noGrp="1"/>
+          </p:cNvSpPr>
+          <p:nvPr>
+            <p:ph type="sldNum" sz="quarter" idx="12"/>
+          </p:nvPr>
+        </p:nvSpPr>
+        <p:spPr/>
+        <p:txBody>
+          <a:bodyPr/>
+          <a:lstStyle/>
+          <a:p>
+            <a:fld id="{3996240E-C573-234B-A5E3-DA0A99988C77}" type="slidenum">
+              <a:rPr lang="en-US" smtClean="0"/>
+              <a:t>7</a:t>
+            </a:fld>
+            <a:endParaRPr lang="en-US"/>
+          </a:p>
+        </p:txBody>
+      </p:sp>
+      <p:pic>
+        <p:nvPicPr>
+          <p:cNvPr id="1026" name="Picture 2">
+            <a:extLst>
+              <a:ext uri="{FF2B5EF4-FFF2-40B4-BE49-F238E27FC236}">
+                <a16:creationId xmlns:a16="http://schemas.microsoft.com/office/drawing/2014/main" id="{92E93739-5CBE-883F-B960-8F018F48AFBE}"/>
+              </a:ext>
+            </a:extLst>
+          </p:cNvPr>
+          <p:cNvPicPr>
+            <a:picLocks noChangeAspect="1" noChangeArrowheads="1"/>
+          </p:cNvPicPr>
+          <p:nvPr/>
+        </p:nvPicPr>
+        <p:blipFill>
+          <a:blip r:embed="rId2">
+            <a:extLst>
+              <a:ext uri="{28A0092B-C50C-407E-A947-70E740481C1C}">
+                <a14:useLocalDpi xmlns:a14="http://schemas.microsoft.com/office/drawing/2010/main" val="0"/>
+              </a:ext>
+            </a:extLst>
+          </a:blip>
+          <a:srcRect/>
+          <a:stretch>
+            <a:fillRect/>
+          </a:stretch>
+        </p:blipFill>
+        <p:spPr bwMode="auto">
+          <a:xfrm>
+            <a:off x="7010400" y="601939"/>
+            <a:ext cx="5029200" cy="5029200"/>
+          </a:xfrm>
+          <a:prstGeom prst="rect">
+            <a:avLst/>
+          </a:prstGeom>
+          <a:noFill/>
+          <a:extLst>
+            <a:ext uri="{909E8E84-426E-40DD-AFC4-6F175D3DCCD1}">
+              <a14:hiddenFill xmlns:a14="http://schemas.microsoft.com/office/drawing/2010/main">
+                <a:solidFill>
+                  <a:srgbClr val="FFFFFF"/>
+                </a:solidFill>
+              </a14:hiddenFill>
+            </a:ext>
+          </a:extLst>
+        </p:spPr>
+      </p:pic>
+    </p:spTree>
+    <p:extLst>
+      <p:ext uri="{BB962C8B-B14F-4D97-AF65-F5344CB8AC3E}">
+        <p14:creationId xmlns:p14="http://schemas.microsoft.com/office/powerpoint/2010/main" val="2301928180"/>
+      </p:ext>
+    </p:extLst>
+  </p:cSld>
+  <p:clrMapOvr>
+    <a:masterClrMapping/>
+  </p:clrMapOvr>
+</p:sld>
+</file>
+
+<file path=ppt/slides/slide8.xml><?xml version="1.0" encoding="utf-8"?>
+<p:sld xmlns:a="http://schemas.openxmlformats.org/drawingml/2006/main" xmlns:r="http://schemas.openxmlformats.org/officeDocument/2006/relationships" xmlns:p="http://schemas.openxmlformats.org/presentationml/2006/main">
+  <p:cSld>
     <p:bg>
       <p:bgPr>
         <a:solidFill>
@@ -21549,7 +21820,7 @@
             <p:ph idx="1"/>
             <p:extLst>
               <p:ext uri="{D42A27DB-BD31-4B8C-83A1-F6EECF244321}">
-                <p14:modId xmlns:p14="http://schemas.microsoft.com/office/powerpoint/2010/main" val="664603031"/>
+                <p14:modId xmlns:p14="http://schemas.microsoft.com/office/powerpoint/2010/main" val="3210877266"/>
               </p:ext>
             </p:extLst>
           </p:nvPr>
@@ -22010,7 +22281,7 @@
           <a:p>
             <a:fld id="{3996240E-C573-234B-A5E3-DA0A99988C77}" type="slidenum">
               <a:rPr lang="en-US" smtClean="0"/>
-              <a:t>7</a:t>
+              <a:t>8</a:t>
             </a:fld>
             <a:endParaRPr lang="en-US"/>
           </a:p>

</xml_diff>